<commit_message>
Add car_right.png asset image
Co-authored-by: 330553981 <330553981@qq.com>
</commit_message>
<xml_diff>
--- a/荣威M7DMH_移动端性能审计汇报.pptx
+++ b/荣威M7DMH_移动端性能审计汇报.pptx
@@ -15,6 +15,10 @@
     <p:sldId id="263" r:id="rId14"/>
     <p:sldId id="264" r:id="rId15"/>
     <p:sldId id="265" r:id="rId16"/>
+    <p:sldId id="266" r:id="rId17"/>
+    <p:sldId id="267" r:id="rId18"/>
+    <p:sldId id="268" r:id="rId19"/>
+    <p:sldId id="269" r:id="rId20"/>
   </p:sldIdLst>
   <p:sldSz cx="9144000" cy="6858000" type="screen4x3"/>
   <p:notesSz cx="6858000" cy="9144000"/>
@@ -114,6 +118,183 @@
     </a:lvl9pPr>
   </p:defaultTextStyle>
 </p:presentation>
+</file>
+
+<file path=ppt/charts/chart1.xml><?xml version="1.0" encoding="utf-8"?>
+<c:chartSpace xmlns:c="http://schemas.openxmlformats.org/drawingml/2006/chart" xmlns:a="http://schemas.openxmlformats.org/drawingml/2006/main" xmlns:r="http://schemas.openxmlformats.org/officeDocument/2006/relationships">
+  <c:date1904 val="0"/>
+  <c:chart>
+    <c:title>
+      <c:layout/>
+      <c:overlay val="0"/>
+    </c:title>
+    <c:autoTitleDeleted val="0"/>
+    <c:plotArea>
+      <c:barChart>
+        <c:barDir val="col"/>
+        <c:grouping val="clustered"/>
+        <c:ser>
+          <c:idx val="0"/>
+          <c:order val="0"/>
+          <c:tx>
+            <c:strRef>
+              <c:f>Sheet1!$B$1</c:f>
+              <c:strCache>
+                <c:ptCount val="1"/>
+                <c:pt idx="0">
+                  <c:v>优化前</c:v>
+                </c:pt>
+              </c:strCache>
+            </c:strRef>
+          </c:tx>
+          <c:cat>
+            <c:strRef>
+              <c:f>Sheet1!$A$2:$A$5</c:f>
+              <c:strCache>
+                <c:ptCount val="4"/>
+                <c:pt idx="0">
+                  <c:v>JS执行时间(s)</c:v>
+                </c:pt>
+                <c:pt idx="1">
+                  <c:v>图片总传输(MB)</c:v>
+                </c:pt>
+                <c:pt idx="2">
+                  <c:v>字体总传输(MB)</c:v>
+                </c:pt>
+                <c:pt idx="3">
+                  <c:v>首屏视频请求数</c:v>
+                </c:pt>
+              </c:strCache>
+            </c:strRef>
+          </c:cat>
+          <c:val>
+            <c:numRef>
+              <c:f>Sheet1!$B$2:$B$5</c:f>
+              <c:numCache>
+                <c:formatCode>General</c:formatCode>
+                <c:ptCount val="4"/>
+                <c:pt idx="0">
+                  <c:v>2.5</c:v>
+                </c:pt>
+                <c:pt idx="1">
+                  <c:v>6.0</c:v>
+                </c:pt>
+                <c:pt idx="2">
+                  <c:v>11.0</c:v>
+                </c:pt>
+                <c:pt idx="3">
+                  <c:v>2</c:v>
+                </c:pt>
+              </c:numCache>
+            </c:numRef>
+          </c:val>
+        </c:ser>
+        <c:ser>
+          <c:idx val="1"/>
+          <c:order val="1"/>
+          <c:tx>
+            <c:strRef>
+              <c:f>Sheet1!$C$1</c:f>
+              <c:strCache>
+                <c:ptCount val="1"/>
+                <c:pt idx="0">
+                  <c:v>目标</c:v>
+                </c:pt>
+              </c:strCache>
+            </c:strRef>
+          </c:tx>
+          <c:cat>
+            <c:strRef>
+              <c:f>Sheet1!$A$2:$A$5</c:f>
+              <c:strCache>
+                <c:ptCount val="4"/>
+                <c:pt idx="0">
+                  <c:v>JS执行时间(s)</c:v>
+                </c:pt>
+                <c:pt idx="1">
+                  <c:v>图片总传输(MB)</c:v>
+                </c:pt>
+                <c:pt idx="2">
+                  <c:v>字体总传输(MB)</c:v>
+                </c:pt>
+                <c:pt idx="3">
+                  <c:v>首屏视频请求数</c:v>
+                </c:pt>
+              </c:strCache>
+            </c:strRef>
+          </c:cat>
+          <c:val>
+            <c:numRef>
+              <c:f>Sheet1!$C$2:$C$5</c:f>
+              <c:numCache>
+                <c:formatCode>General</c:formatCode>
+                <c:ptCount val="4"/>
+                <c:pt idx="0">
+                  <c:v>1.5</c:v>
+                </c:pt>
+                <c:pt idx="1">
+                  <c:v>2.4</c:v>
+                </c:pt>
+                <c:pt idx="2">
+                  <c:v>1.0</c:v>
+                </c:pt>
+                <c:pt idx="3">
+                  <c:v>0</c:v>
+                </c:pt>
+              </c:numCache>
+            </c:numRef>
+          </c:val>
+        </c:ser>
+        <c:axId val="-2068027336"/>
+        <c:axId val="-2113994440"/>
+      </c:barChart>
+      <c:catAx>
+        <c:axId val="-2068027336"/>
+        <c:scaling>
+          <c:orientation val="minMax"/>
+        </c:scaling>
+        <c:delete val="0"/>
+        <c:axPos val="b"/>
+        <c:majorTickMark val="out"/>
+        <c:minorTickMark val="none"/>
+        <c:tickLblPos val="nextTo"/>
+        <c:crossAx val="-2113994440"/>
+        <c:crosses val="autoZero"/>
+        <c:auto val="1"/>
+        <c:lblAlgn val="ctr"/>
+        <c:lblOffset val="100"/>
+        <c:noMultiLvlLbl val="0"/>
+      </c:catAx>
+      <c:valAx>
+        <c:axId val="-2113994440"/>
+        <c:scaling/>
+        <c:delete val="0"/>
+        <c:axPos val="l"/>
+        <c:majorGridlines/>
+        <c:majorTickMark val="out"/>
+        <c:minorTickMark val="none"/>
+        <c:tickLblPos val="nextTo"/>
+        <c:crossAx val="-2068027336"/>
+        <c:crosses val="autoZero"/>
+      </c:valAx>
+    </c:plotArea>
+    <c:legend/>
+    <c:dispBlanksAs val="gap"/>
+  </c:chart>
+  <c:txPr>
+    <a:bodyPr/>
+    <a:lstStyle/>
+    <a:p>
+      <a:pPr>
+        <a:defRPr sz="1800"/>
+      </a:pPr>
+      <a:endParaRPr lang="en-US"/>
+    </a:p>
+  </c:txPr>
+  <c:externalData r:id="rId1">
+    <c:autoUpdate val="0"/>
+  </c:externalData>
+</c:chartSpace>
 </file>
 
 <file path=ppt/slideLayouts/slideLayout1.xml><?xml version="1.0" encoding="utf-8"?>
@@ -3289,6 +3470,456 @@
             </a:pPr>
             <a:r>
               <a:t>排期：P0(1–3天) → P1(并行1周) → P2(2–4周治理)</a:t>
+            </a:r>
+          </a:p>
+        </p:txBody>
+      </p:sp>
+    </p:spTree>
+  </p:cSld>
+  <p:clrMapOvr>
+    <a:masterClrMapping/>
+  </p:clrMapOvr>
+</p:sld>
+</file>
+
+<file path=ppt/slides/slide11.xml><?xml version="1.0" encoding="utf-8"?>
+<p:sld xmlns:a="http://schemas.openxmlformats.org/drawingml/2006/main" xmlns:p="http://schemas.openxmlformats.org/presentationml/2006/main" xmlns:r="http://schemas.openxmlformats.org/officeDocument/2006/relationships">
+  <p:cSld>
+    <p:spTree>
+      <p:nvGrpSpPr>
+        <p:cNvPr id="1" name=""/>
+        <p:cNvGrpSpPr/>
+        <p:nvPr/>
+      </p:nvGrpSpPr>
+      <p:grpSpPr/>
+      <p:sp>
+        <p:nvSpPr>
+          <p:cNvPr id="2" name="Title 1"/>
+          <p:cNvSpPr>
+            <a:spLocks noGrp="1"/>
+          </p:cNvSpPr>
+          <p:nvPr>
+            <p:ph type="title"/>
+          </p:nvPr>
+        </p:nvSpPr>
+        <p:spPr/>
+        <p:txBody>
+          <a:bodyPr/>
+          <a:lstStyle/>
+          <a:p/>
+        </p:txBody>
+      </p:sp>
+      <p:sp>
+        <p:nvSpPr>
+          <p:cNvPr id="3" name="TextBox 2"/>
+          <p:cNvSpPr txBox="1"/>
+          <p:nvPr/>
+        </p:nvSpPr>
+        <p:spPr>
+          <a:xfrm>
+            <a:off x="731520" y="548640"/>
+            <a:ext cx="7680960" cy="640080"/>
+          </a:xfrm>
+          <a:prstGeom prst="rect">
+            <a:avLst/>
+          </a:prstGeom>
+          <a:noFill/>
+        </p:spPr>
+        <p:txBody>
+          <a:bodyPr wrap="none">
+            <a:spAutoFit/>
+          </a:bodyPr>
+          <a:lstStyle/>
+          <a:p>
+            <a:pPr>
+              <a:defRPr sz="2800" b="1"/>
+            </a:pPr>
+            <a:r>
+              <a:t>页面视觉参考</a:t>
+            </a:r>
+          </a:p>
+        </p:txBody>
+      </p:sp>
+      <p:pic>
+        <p:nvPicPr>
+          <p:cNvPr id="4" name="Picture 3" descr="logo0608.png"/>
+          <p:cNvPicPr>
+            <a:picLocks noChangeAspect="1"/>
+          </p:cNvPicPr>
+          <p:nvPr/>
+        </p:nvPicPr>
+        <p:blipFill>
+          <a:blip r:embed="rId2"/>
+          <a:stretch>
+            <a:fillRect/>
+          </a:stretch>
+        </p:blipFill>
+        <p:spPr>
+          <a:xfrm>
+            <a:off x="731520" y="1280160"/>
+            <a:ext cx="9144000" cy="914400"/>
+          </a:xfrm>
+          <a:prstGeom prst="rect">
+            <a:avLst/>
+          </a:prstGeom>
+        </p:spPr>
+      </p:pic>
+      <p:pic>
+        <p:nvPicPr>
+          <p:cNvPr id="5" name="Picture 4" descr="car_right.png"/>
+          <p:cNvPicPr>
+            <a:picLocks noChangeAspect="1"/>
+          </p:cNvPicPr>
+          <p:nvPr/>
+        </p:nvPicPr>
+        <p:blipFill>
+          <a:blip r:embed="rId3"/>
+          <a:stretch>
+            <a:fillRect/>
+          </a:stretch>
+        </p:blipFill>
+        <p:spPr>
+          <a:xfrm>
+            <a:off x="731520" y="2377440"/>
+            <a:ext cx="6792686" cy="2743200"/>
+          </a:xfrm>
+          <a:prstGeom prst="rect">
+            <a:avLst/>
+          </a:prstGeom>
+        </p:spPr>
+      </p:pic>
+    </p:spTree>
+  </p:cSld>
+  <p:clrMapOvr>
+    <a:masterClrMapping/>
+  </p:clrMapOvr>
+</p:sld>
+</file>
+
+<file path=ppt/slides/slide12.xml><?xml version="1.0" encoding="utf-8"?>
+<p:sld xmlns:a="http://schemas.openxmlformats.org/drawingml/2006/main" xmlns:p="http://schemas.openxmlformats.org/presentationml/2006/main" xmlns:r="http://schemas.openxmlformats.org/officeDocument/2006/relationships">
+  <p:cSld>
+    <p:spTree>
+      <p:nvGrpSpPr>
+        <p:cNvPr id="1" name=""/>
+        <p:cNvGrpSpPr/>
+        <p:nvPr/>
+      </p:nvGrpSpPr>
+      <p:grpSpPr/>
+      <p:sp>
+        <p:nvSpPr>
+          <p:cNvPr id="2" name="Title 1"/>
+          <p:cNvSpPr>
+            <a:spLocks noGrp="1"/>
+          </p:cNvSpPr>
+          <p:nvPr>
+            <p:ph type="title"/>
+          </p:nvPr>
+        </p:nvSpPr>
+        <p:spPr/>
+        <p:txBody>
+          <a:bodyPr/>
+          <a:lstStyle/>
+          <a:p/>
+        </p:txBody>
+      </p:sp>
+      <p:sp>
+        <p:nvSpPr>
+          <p:cNvPr id="3" name="TextBox 2"/>
+          <p:cNvSpPr txBox="1"/>
+          <p:nvPr/>
+        </p:nvSpPr>
+        <p:spPr>
+          <a:xfrm>
+            <a:off x="731520" y="548640"/>
+            <a:ext cx="7680960" cy="640080"/>
+          </a:xfrm>
+          <a:prstGeom prst="rect">
+            <a:avLst/>
+          </a:prstGeom>
+          <a:noFill/>
+        </p:spPr>
+        <p:txBody>
+          <a:bodyPr wrap="none">
+            <a:spAutoFit/>
+          </a:bodyPr>
+          <a:lstStyle/>
+          <a:p>
+            <a:pPr>
+              <a:defRPr sz="2800" b="1"/>
+            </a:pPr>
+            <a:r>
+              <a:t>资源体积对比（优化前 vs 目标）</a:t>
+            </a:r>
+          </a:p>
+        </p:txBody>
+      </p:sp>
+      <p:graphicFrame>
+        <p:nvGraphicFramePr>
+          <p:cNvPr id="4" name="Chart 3"/>
+          <p:cNvGraphicFramePr>
+            <a:graphicFrameLocks noGrp="1"/>
+          </p:cNvGraphicFramePr>
+          <p:nvPr/>
+        </p:nvGraphicFramePr>
+        <p:xfrm>
+          <a:off x="731520" y="1280160"/>
+          <a:ext cx="7680960" cy="3657600"/>
+        </p:xfrm>
+        <a:graphic>
+          <a:graphicData uri="http://schemas.openxmlformats.org/drawingml/2006/chart">
+            <c:chart xmlns:c="http://schemas.openxmlformats.org/drawingml/2006/chart" r:id="rId2"/>
+          </a:graphicData>
+        </a:graphic>
+      </p:graphicFrame>
+    </p:spTree>
+  </p:cSld>
+  <p:clrMapOvr>
+    <a:masterClrMapping/>
+  </p:clrMapOvr>
+</p:sld>
+</file>
+
+<file path=ppt/slides/slide13.xml><?xml version="1.0" encoding="utf-8"?>
+<p:sld xmlns:a="http://schemas.openxmlformats.org/drawingml/2006/main" xmlns:p="http://schemas.openxmlformats.org/presentationml/2006/main" xmlns:r="http://schemas.openxmlformats.org/officeDocument/2006/relationships">
+  <p:cSld>
+    <p:spTree>
+      <p:nvGrpSpPr>
+        <p:cNvPr id="1" name=""/>
+        <p:cNvGrpSpPr/>
+        <p:nvPr/>
+      </p:nvGrpSpPr>
+      <p:grpSpPr/>
+      <p:sp>
+        <p:nvSpPr>
+          <p:cNvPr id="2" name="Title 1"/>
+          <p:cNvSpPr>
+            <a:spLocks noGrp="1"/>
+          </p:cNvSpPr>
+          <p:nvPr>
+            <p:ph type="title"/>
+          </p:nvPr>
+        </p:nvSpPr>
+        <p:spPr/>
+        <p:txBody>
+          <a:bodyPr/>
+          <a:lstStyle/>
+          <a:p/>
+        </p:txBody>
+      </p:sp>
+      <p:sp>
+        <p:nvSpPr>
+          <p:cNvPr id="3" name="TextBox 2"/>
+          <p:cNvSpPr txBox="1"/>
+          <p:nvPr/>
+        </p:nvSpPr>
+        <p:spPr>
+          <a:xfrm>
+            <a:off x="731520" y="548640"/>
+            <a:ext cx="7680960" cy="640080"/>
+          </a:xfrm>
+          <a:prstGeom prst="rect">
+            <a:avLst/>
+          </a:prstGeom>
+          <a:noFill/>
+        </p:spPr>
+        <p:txBody>
+          <a:bodyPr wrap="none">
+            <a:spAutoFit/>
+          </a:bodyPr>
+          <a:lstStyle/>
+          <a:p>
+            <a:pPr>
+              <a:defRPr sz="2800" b="1"/>
+            </a:pPr>
+            <a:r>
+              <a:t>页面级出队清单（m7-dmh-preheat）</a:t>
+            </a:r>
+          </a:p>
+        </p:txBody>
+      </p:sp>
+      <p:sp>
+        <p:nvSpPr>
+          <p:cNvPr id="4" name="TextBox 3"/>
+          <p:cNvSpPr txBox="1"/>
+          <p:nvPr/>
+        </p:nvSpPr>
+        <p:spPr>
+          <a:xfrm>
+            <a:off x="731520" y="1280160"/>
+            <a:ext cx="7680960" cy="4572000"/>
+          </a:xfrm>
+          <a:prstGeom prst="rect">
+            <a:avLst/>
+          </a:prstGeom>
+          <a:noFill/>
+        </p:spPr>
+        <p:txBody>
+          <a:bodyPr wrap="square">
+            <a:spAutoFit/>
+          </a:bodyPr>
+          <a:lstStyle/>
+          <a:p/>
+          <a:p>
+            <a:pPr>
+              <a:defRPr sz="1800"/>
+            </a:pPr>
+            <a:r>
+              <a:t>脚本：jquery-migrate、wp-polyfill*、jet-vue-js、browser.js、md5.min.js（改延迟/点击加载）</a:t>
+            </a:r>
+          </a:p>
+          <a:p>
+            <a:pPr>
+              <a:defRPr sz="1800"/>
+            </a:pPr>
+            <a:r>
+              <a:t>业务：/rw-statics/testdrive/* 首屏不加载（点击“预约试驾”再插入）</a:t>
+            </a:r>
+          </a:p>
+          <a:p>
+            <a:pPr>
+              <a:defRPr sz="1800"/>
+            </a:pPr>
+            <a:r>
+              <a:t>样式：地图 SearchInfoWindow.css（如未使用）</a:t>
+            </a:r>
+          </a:p>
+          <a:p>
+            <a:pPr>
+              <a:defRPr sz="1800"/>
+            </a:pPr>
+            <a:r>
+              <a:t>PC专用：PC模板相关 JS/CSS 在移动端出队</a:t>
+            </a:r>
+          </a:p>
+        </p:txBody>
+      </p:sp>
+    </p:spTree>
+  </p:cSld>
+  <p:clrMapOvr>
+    <a:masterClrMapping/>
+  </p:clrMapOvr>
+</p:sld>
+</file>
+
+<file path=ppt/slides/slide14.xml><?xml version="1.0" encoding="utf-8"?>
+<p:sld xmlns:a="http://schemas.openxmlformats.org/drawingml/2006/main" xmlns:p="http://schemas.openxmlformats.org/presentationml/2006/main" xmlns:r="http://schemas.openxmlformats.org/officeDocument/2006/relationships">
+  <p:cSld>
+    <p:spTree>
+      <p:nvGrpSpPr>
+        <p:cNvPr id="1" name=""/>
+        <p:cNvGrpSpPr/>
+        <p:nvPr/>
+      </p:nvGrpSpPr>
+      <p:grpSpPr/>
+      <p:sp>
+        <p:nvSpPr>
+          <p:cNvPr id="2" name="Title 1"/>
+          <p:cNvSpPr>
+            <a:spLocks noGrp="1"/>
+          </p:cNvSpPr>
+          <p:nvPr>
+            <p:ph type="title"/>
+          </p:nvPr>
+        </p:nvSpPr>
+        <p:spPr/>
+        <p:txBody>
+          <a:bodyPr/>
+          <a:lstStyle/>
+          <a:p/>
+        </p:txBody>
+      </p:sp>
+      <p:sp>
+        <p:nvSpPr>
+          <p:cNvPr id="3" name="TextBox 2"/>
+          <p:cNvSpPr txBox="1"/>
+          <p:nvPr/>
+        </p:nvSpPr>
+        <p:spPr>
+          <a:xfrm>
+            <a:off x="731520" y="548640"/>
+            <a:ext cx="7680960" cy="640080"/>
+          </a:xfrm>
+          <a:prstGeom prst="rect">
+            <a:avLst/>
+          </a:prstGeom>
+          <a:noFill/>
+        </p:spPr>
+        <p:txBody>
+          <a:bodyPr wrap="none">
+            <a:spAutoFit/>
+          </a:bodyPr>
+          <a:lstStyle/>
+          <a:p>
+            <a:pPr>
+              <a:defRPr sz="2800" b="1"/>
+            </a:pPr>
+            <a:r>
+              <a:t>配置步骤与代码片段（摘要）</a:t>
+            </a:r>
+          </a:p>
+        </p:txBody>
+      </p:sp>
+      <p:sp>
+        <p:nvSpPr>
+          <p:cNvPr id="4" name="TextBox 3"/>
+          <p:cNvSpPr txBox="1"/>
+          <p:nvPr/>
+        </p:nvSpPr>
+        <p:spPr>
+          <a:xfrm>
+            <a:off x="731520" y="1280160"/>
+            <a:ext cx="7680960" cy="4572000"/>
+          </a:xfrm>
+          <a:prstGeom prst="rect">
+            <a:avLst/>
+          </a:prstGeom>
+          <a:noFill/>
+        </p:spPr>
+        <p:txBody>
+          <a:bodyPr wrap="square">
+            <a:spAutoFit/>
+          </a:bodyPr>
+          <a:lstStyle/>
+          <a:p/>
+          <a:p>
+            <a:pPr>
+              <a:defRPr sz="1800"/>
+            </a:pPr>
+            <a:r>
+              <a:t>WordPress 出队：functions.php 中按页面 wp_dequeue_script/style</a:t>
+            </a:r>
+          </a:p>
+          <a:p>
+            <a:pPr>
+              <a:defRPr sz="1800"/>
+            </a:pPr>
+            <a:r>
+              <a:t>LiteSpeed：开启JS延迟、CSS异步，Brotli 压缩</a:t>
+            </a:r>
+          </a:p>
+          <a:p>
+            <a:pPr>
+              <a:defRPr sz="1800"/>
+            </a:pPr>
+            <a:r>
+              <a:t>字体：TTF→WOFF2 子集；font-display:swap；unicode-range 分层</a:t>
+            </a:r>
+          </a:p>
+          <a:p>
+            <a:pPr>
+              <a:defRPr sz="1800"/>
+            </a:pPr>
+            <a:r>
+              <a:t>图片：WebP/AVIF 多规格 + loading=lazy；首屏图 preload</a:t>
+            </a:r>
+          </a:p>
+          <a:p>
+            <a:pPr>
+              <a:defRPr sz="1800"/>
+            </a:pPr>
+            <a:r>
+              <a:t>视频：preload=none；进视口/点击后设置 src 并播放</a:t>
             </a:r>
           </a:p>
         </p:txBody>

</xml_diff>